<commit_message>
added color options for arrows for slowing, and added outlined oval option
</commit_message>
<xml_diff>
--- a/stimuli/arrows/arrows.pptx
+++ b/stimuli/arrows/arrows.pptx
@@ -3123,7 +3123,7 @@
           <a:p>
             <a:pPr algn="ctr"/>
             <a:r>
-              <a:rPr lang="en-US" sz="8000" b="1" cap="none" spc="0" dirty="0" smtClean="0">
+              <a:rPr lang="en-US" sz="8000" b="1" dirty="0">
                 <a:ln w="12700">
                   <a:solidFill>
                     <a:srgbClr val="000000"/>
@@ -3157,7 +3157,7 @@
               </a:rPr>
               <a:t>&gt;</a:t>
             </a:r>
-            <a:endParaRPr lang="en-US" sz="8000" b="1" cap="none" spc="0" dirty="0">
+            <a:endParaRPr lang="en-US" sz="8000" b="1" dirty="0">
               <a:ln w="12700">
                 <a:solidFill>
                   <a:srgbClr val="000000"/>
@@ -3166,6 +3166,162 @@
               </a:ln>
               <a:solidFill>
                 <a:schemeClr val="bg1"/>
+              </a:solidFill>
+              <a:latin typeface="Arial"/>
+              <a:cs typeface="Arial"/>
+            </a:endParaRPr>
+          </a:p>
+        </p:txBody>
+      </p:sp>
+      <p:sp>
+        <p:nvSpPr>
+          <p:cNvPr id="5" name="Rectangle 4"/>
+          <p:cNvSpPr/>
+          <p:nvPr/>
+        </p:nvSpPr>
+        <p:spPr>
+          <a:xfrm>
+            <a:off x="2465666" y="160635"/>
+            <a:ext cx="783788" cy="2554545"/>
+          </a:xfrm>
+          <a:prstGeom prst="rect">
+            <a:avLst/>
+          </a:prstGeom>
+          <a:noFill/>
+          <a:ln>
+            <a:noFill/>
+          </a:ln>
+          <a:effectLst/>
+        </p:spPr>
+        <p:txBody>
+          <a:bodyPr wrap="none" lIns="91440" tIns="45720" rIns="91440" bIns="45720">
+            <a:spAutoFit/>
+          </a:bodyPr>
+          <a:lstStyle/>
+          <a:p>
+            <a:pPr algn="ctr"/>
+            <a:r>
+              <a:rPr lang="en-US" sz="8000" b="1" dirty="0">
+                <a:ln w="12700">
+                  <a:solidFill>
+                    <a:srgbClr val="000000"/>
+                  </a:solidFill>
+                  <a:prstDash val="solid"/>
+                </a:ln>
+                <a:solidFill>
+                  <a:srgbClr val="FF0000"/>
+                </a:solidFill>
+                <a:latin typeface="Arial"/>
+                <a:cs typeface="Arial"/>
+              </a:rPr>
+              <a:t>&lt;</a:t>
+            </a:r>
+          </a:p>
+          <a:p>
+            <a:pPr algn="ctr"/>
+            <a:r>
+              <a:rPr lang="en-US" sz="8000" b="1" dirty="0">
+                <a:ln w="12700">
+                  <a:solidFill>
+                    <a:srgbClr val="000000"/>
+                  </a:solidFill>
+                  <a:prstDash val="solid"/>
+                </a:ln>
+                <a:solidFill>
+                  <a:srgbClr val="FF0000"/>
+                </a:solidFill>
+                <a:latin typeface="Arial"/>
+                <a:cs typeface="Arial"/>
+              </a:rPr>
+              <a:t>&gt;</a:t>
+            </a:r>
+            <a:endParaRPr lang="en-US" sz="8000" b="1" dirty="0">
+              <a:ln w="12700">
+                <a:solidFill>
+                  <a:srgbClr val="000000"/>
+                </a:solidFill>
+                <a:prstDash val="solid"/>
+              </a:ln>
+              <a:solidFill>
+                <a:srgbClr val="FF0000"/>
+              </a:solidFill>
+              <a:latin typeface="Arial"/>
+              <a:cs typeface="Arial"/>
+            </a:endParaRPr>
+          </a:p>
+        </p:txBody>
+      </p:sp>
+      <p:sp>
+        <p:nvSpPr>
+          <p:cNvPr id="6" name="Rectangle 5"/>
+          <p:cNvSpPr/>
+          <p:nvPr/>
+        </p:nvSpPr>
+        <p:spPr>
+          <a:xfrm>
+            <a:off x="4065807" y="160635"/>
+            <a:ext cx="783788" cy="2554545"/>
+          </a:xfrm>
+          <a:prstGeom prst="rect">
+            <a:avLst/>
+          </a:prstGeom>
+          <a:noFill/>
+          <a:ln>
+            <a:noFill/>
+          </a:ln>
+          <a:effectLst/>
+        </p:spPr>
+        <p:txBody>
+          <a:bodyPr wrap="none" lIns="91440" tIns="45720" rIns="91440" bIns="45720">
+            <a:spAutoFit/>
+          </a:bodyPr>
+          <a:lstStyle/>
+          <a:p>
+            <a:pPr algn="ctr"/>
+            <a:r>
+              <a:rPr lang="en-US" sz="8000" b="1" dirty="0">
+                <a:ln w="12700">
+                  <a:solidFill>
+                    <a:srgbClr val="000000"/>
+                  </a:solidFill>
+                  <a:prstDash val="solid"/>
+                </a:ln>
+                <a:solidFill>
+                  <a:srgbClr val="E48000"/>
+                </a:solidFill>
+                <a:latin typeface="Arial"/>
+                <a:cs typeface="Arial"/>
+              </a:rPr>
+              <a:t>&lt;</a:t>
+            </a:r>
+          </a:p>
+          <a:p>
+            <a:pPr algn="ctr"/>
+            <a:r>
+              <a:rPr lang="en-US" sz="8000" b="1" dirty="0">
+                <a:ln w="12700">
+                  <a:solidFill>
+                    <a:srgbClr val="000000"/>
+                  </a:solidFill>
+                  <a:prstDash val="solid"/>
+                </a:ln>
+                <a:solidFill>
+                  <a:srgbClr val="E48000"/>
+                </a:solidFill>
+                <a:latin typeface="Arial"/>
+                <a:cs typeface="Arial"/>
+              </a:rPr>
+              <a:t>&gt;</a:t>
+            </a:r>
+            <a:endParaRPr lang="en-US" sz="8000" b="1" dirty="0">
+              <a:ln w="12700">
+                <a:solidFill>
+                  <a:srgbClr val="000000"/>
+                </a:solidFill>
+                <a:prstDash val="solid"/>
+              </a:ln>
+              <a:solidFill>
+                <a:srgbClr val="E48000"/>
               </a:solidFill>
               <a:latin typeface="Arial"/>
               <a:cs typeface="Arial"/>

</xml_diff>